<commit_message>
update gitbook for EJS
</commit_message>
<xml_diff>
--- a/EjsTemplates/EjsTemplates.pptx
+++ b/EjsTemplates/EjsTemplates.pptx
@@ -216,7 +216,7 @@
           <a:p>
             <a:fld id="{19104133-B5B0-4351-8158-4F0E5EB1E2BF}" type="datetimeFigureOut">
               <a:rPr lang="en-US" smtClean="0"/>
-              <a:t>1/17/2020</a:t>
+              <a:t>3/17/2020</a:t>
             </a:fld>
             <a:endParaRPr lang="en-US"/>
           </a:p>
@@ -644,6 +644,14 @@
             <a:r>
               <a:rPr lang="en-US" baseline="0" dirty="0" smtClean="0"/>
               <a:t> an NPM package that </a:t>
+            </a:r>
+            <a:r>
+              <a:rPr lang="en-US" baseline="0" dirty="0" smtClean="0"/>
+              <a:t>allows developers to embed JavaScript into </a:t>
+            </a:r>
+            <a:r>
+              <a:rPr lang="en-US" baseline="0" smtClean="0"/>
+              <a:t>HTML templates</a:t>
             </a:r>
             <a:endParaRPr lang="en-US" dirty="0"/>
           </a:p>
@@ -1341,7 +1349,7 @@
             <a:fld id="{1C2D31DE-C454-491C-B5C3-F097855E3DF7}" type="datetime4">
               <a:rPr lang="en-US" smtClean="0"/>
               <a:pPr/>
-              <a:t>January 17, 2020</a:t>
+              <a:t>March 17, 2020</a:t>
             </a:fld>
             <a:endParaRPr lang="en-US" dirty="0"/>
           </a:p>
@@ -4741,7 +4749,7 @@
           <a:p>
             <a:fld id="{5958763E-B898-436D-883D-03711491D54A}" type="datetimeFigureOut">
               <a:rPr lang="en-US" smtClean="0"/>
-              <a:t>1/17/2020</a:t>
+              <a:t>3/17/2020</a:t>
             </a:fld>
             <a:endParaRPr lang="en-US"/>
           </a:p>
@@ -4942,7 +4950,7 @@
           <a:p>
             <a:fld id="{5958763E-B898-436D-883D-03711491D54A}" type="datetimeFigureOut">
               <a:rPr lang="en-US" smtClean="0"/>
-              <a:t>1/17/2020</a:t>
+              <a:t>3/17/2020</a:t>
             </a:fld>
             <a:endParaRPr lang="en-US"/>
           </a:p>
@@ -5199,7 +5207,7 @@
           <a:p>
             <a:fld id="{5958763E-B898-436D-883D-03711491D54A}" type="datetimeFigureOut">
               <a:rPr lang="en-US" smtClean="0"/>
-              <a:t>1/17/2020</a:t>
+              <a:t>3/17/2020</a:t>
             </a:fld>
             <a:endParaRPr lang="en-US"/>
           </a:p>
@@ -5554,7 +5562,7 @@
           <a:p>
             <a:fld id="{5958763E-B898-436D-883D-03711491D54A}" type="datetimeFigureOut">
               <a:rPr lang="en-US" smtClean="0"/>
-              <a:t>1/17/2020</a:t>
+              <a:t>3/17/2020</a:t>
             </a:fld>
             <a:endParaRPr lang="en-US"/>
           </a:p>
@@ -5977,7 +5985,7 @@
           <a:p>
             <a:fld id="{5958763E-B898-436D-883D-03711491D54A}" type="datetimeFigureOut">
               <a:rPr lang="en-US" smtClean="0"/>
-              <a:t>1/17/2020</a:t>
+              <a:t>3/17/2020</a:t>
             </a:fld>
             <a:endParaRPr lang="en-US"/>
           </a:p>
@@ -6485,7 +6493,7 @@
           <a:p>
             <a:fld id="{5958763E-B898-436D-883D-03711491D54A}" type="datetimeFigureOut">
               <a:rPr lang="en-US" smtClean="0"/>
-              <a:t>1/17/2020</a:t>
+              <a:t>3/17/2020</a:t>
             </a:fld>
             <a:endParaRPr lang="en-US"/>
           </a:p>
@@ -6943,7 +6951,7 @@
           <a:p>
             <a:fld id="{5958763E-B898-436D-883D-03711491D54A}" type="datetimeFigureOut">
               <a:rPr lang="en-US" smtClean="0"/>
-              <a:t>1/17/2020</a:t>
+              <a:t>3/17/2020</a:t>
             </a:fld>
             <a:endParaRPr lang="en-US"/>
           </a:p>
@@ -7561,7 +7569,7 @@
           <a:p>
             <a:fld id="{5958763E-B898-436D-883D-03711491D54A}" type="datetimeFigureOut">
               <a:rPr lang="en-US" smtClean="0"/>
-              <a:t>1/17/2020</a:t>
+              <a:t>3/17/2020</a:t>
             </a:fld>
             <a:endParaRPr lang="en-US"/>
           </a:p>
@@ -8339,7 +8347,7 @@
           <a:p>
             <a:fld id="{5958763E-B898-436D-883D-03711491D54A}" type="datetimeFigureOut">
               <a:rPr lang="en-US" smtClean="0"/>
-              <a:t>1/17/2020</a:t>
+              <a:t>3/17/2020</a:t>
             </a:fld>
             <a:endParaRPr lang="en-US"/>
           </a:p>
@@ -8450,7 +8458,7 @@
           <a:p>
             <a:fld id="{5958763E-B898-436D-883D-03711491D54A}" type="datetimeFigureOut">
               <a:rPr lang="en-US" smtClean="0"/>
-              <a:t>1/17/2020</a:t>
+              <a:t>3/17/2020</a:t>
             </a:fld>
             <a:endParaRPr lang="en-US"/>
           </a:p>
@@ -8792,7 +8800,7 @@
             <a:fld id="{1C2D31DE-C454-491C-B5C3-F097855E3DF7}" type="datetime4">
               <a:rPr lang="en-US" smtClean="0"/>
               <a:pPr/>
-              <a:t>January 17, 2020</a:t>
+              <a:t>March 17, 2020</a:t>
             </a:fld>
             <a:endParaRPr lang="en-US" dirty="0"/>
           </a:p>
@@ -11952,7 +11960,7 @@
           <a:p>
             <a:fld id="{5958763E-B898-436D-883D-03711491D54A}" type="datetimeFigureOut">
               <a:rPr lang="en-US" smtClean="0"/>
-              <a:t>1/17/2020</a:t>
+              <a:t>3/17/2020</a:t>
             </a:fld>
             <a:endParaRPr lang="en-US"/>
           </a:p>
@@ -12083,7 +12091,7 @@
           <a:p>
             <a:fld id="{5958763E-B898-436D-883D-03711491D54A}" type="datetimeFigureOut">
               <a:rPr lang="en-US" smtClean="0"/>
-              <a:t>1/17/2020</a:t>
+              <a:t>3/17/2020</a:t>
             </a:fld>
             <a:endParaRPr lang="en-US"/>
           </a:p>
@@ -12214,7 +12222,7 @@
           <a:p>
             <a:fld id="{5958763E-B898-436D-883D-03711491D54A}" type="datetimeFigureOut">
               <a:rPr lang="en-US" smtClean="0"/>
-              <a:t>1/17/2020</a:t>
+              <a:t>3/17/2020</a:t>
             </a:fld>
             <a:endParaRPr lang="en-US"/>
           </a:p>
@@ -12345,7 +12353,7 @@
           <a:p>
             <a:fld id="{5958763E-B898-436D-883D-03711491D54A}" type="datetimeFigureOut">
               <a:rPr lang="en-US" smtClean="0"/>
-              <a:t>1/17/2020</a:t>
+              <a:t>3/17/2020</a:t>
             </a:fld>
             <a:endParaRPr lang="en-US"/>
           </a:p>
@@ -12476,7 +12484,7 @@
           <a:p>
             <a:fld id="{5958763E-B898-436D-883D-03711491D54A}" type="datetimeFigureOut">
               <a:rPr lang="en-US" smtClean="0"/>
-              <a:t>1/17/2020</a:t>
+              <a:t>3/17/2020</a:t>
             </a:fld>
             <a:endParaRPr lang="en-US"/>
           </a:p>
@@ -12607,7 +12615,7 @@
           <a:p>
             <a:fld id="{5958763E-B898-436D-883D-03711491D54A}" type="datetimeFigureOut">
               <a:rPr lang="en-US" smtClean="0"/>
-              <a:t>1/17/2020</a:t>
+              <a:t>3/17/2020</a:t>
             </a:fld>
             <a:endParaRPr lang="en-US"/>
           </a:p>
@@ -12738,7 +12746,7 @@
           <a:p>
             <a:fld id="{5958763E-B898-436D-883D-03711491D54A}" type="datetimeFigureOut">
               <a:rPr lang="en-US" smtClean="0"/>
-              <a:t>1/17/2020</a:t>
+              <a:t>3/17/2020</a:t>
             </a:fld>
             <a:endParaRPr lang="en-US"/>
           </a:p>
@@ -12869,7 +12877,7 @@
           <a:p>
             <a:fld id="{5958763E-B898-436D-883D-03711491D54A}" type="datetimeFigureOut">
               <a:rPr lang="en-US" smtClean="0"/>
-              <a:t>1/17/2020</a:t>
+              <a:t>3/17/2020</a:t>
             </a:fld>
             <a:endParaRPr lang="en-US"/>
           </a:p>
@@ -13009,7 +13017,7 @@
           <a:p>
             <a:fld id="{5958763E-B898-436D-883D-03711491D54A}" type="datetimeFigureOut">
               <a:rPr lang="en-US" smtClean="0"/>
-              <a:t>1/17/2020</a:t>
+              <a:t>3/17/2020</a:t>
             </a:fld>
             <a:endParaRPr lang="en-US"/>
           </a:p>
@@ -16370,7 +16378,7 @@
             <a:fld id="{1C2D31DE-C454-491C-B5C3-F097855E3DF7}" type="datetime4">
               <a:rPr lang="en-US" smtClean="0"/>
               <a:pPr/>
-              <a:t>January 17, 2020</a:t>
+              <a:t>March 17, 2020</a:t>
             </a:fld>
             <a:endParaRPr lang="en-US" dirty="0"/>
           </a:p>
@@ -28615,7 +28623,7 @@
           <a:p>
             <a:fld id="{5958763E-B898-436D-883D-03711491D54A}" type="datetimeFigureOut">
               <a:rPr lang="en-US" smtClean="0"/>
-              <a:t>1/17/2020</a:t>
+              <a:t>3/17/2020</a:t>
             </a:fld>
             <a:endParaRPr lang="en-US"/>
           </a:p>
@@ -29024,7 +29032,7 @@
           <a:p>
             <a:fld id="{5958763E-B898-436D-883D-03711491D54A}" type="datetimeFigureOut">
               <a:rPr lang="en-US" smtClean="0"/>
-              <a:t>1/17/2020</a:t>
+              <a:t>3/17/2020</a:t>
             </a:fld>
             <a:endParaRPr lang="en-US"/>
           </a:p>
@@ -29325,7 +29333,7 @@
           <a:p>
             <a:fld id="{5958763E-B898-436D-883D-03711491D54A}" type="datetimeFigureOut">
               <a:rPr lang="en-US" smtClean="0"/>
-              <a:t>1/17/2020</a:t>
+              <a:t>3/17/2020</a:t>
             </a:fld>
             <a:endParaRPr lang="en-US"/>
           </a:p>
@@ -29533,7 +29541,7 @@
           <a:p>
             <a:fld id="{5958763E-B898-436D-883D-03711491D54A}" type="datetimeFigureOut">
               <a:rPr lang="en-US" smtClean="0"/>
-              <a:t>1/17/2020</a:t>
+              <a:t>3/17/2020</a:t>
             </a:fld>
             <a:endParaRPr lang="en-US"/>
           </a:p>
@@ -29801,7 +29809,7 @@
           <a:p>
             <a:fld id="{5958763E-B898-436D-883D-03711491D54A}" type="datetimeFigureOut">
               <a:rPr lang="en-US" smtClean="0"/>
-              <a:t>1/17/2020</a:t>
+              <a:t>3/17/2020</a:t>
             </a:fld>
             <a:endParaRPr lang="en-US"/>
           </a:p>
@@ -30318,7 +30326,7 @@
           <a:p>
             <a:fld id="{5958763E-B898-436D-883D-03711491D54A}" type="datetimeFigureOut">
               <a:rPr lang="en-US" smtClean="0"/>
-              <a:t>1/17/2020</a:t>
+              <a:t>3/17/2020</a:t>
             </a:fld>
             <a:endParaRPr lang="en-US"/>
           </a:p>
@@ -30806,7 +30814,7 @@
           <a:p>
             <a:fld id="{5958763E-B898-436D-883D-03711491D54A}" type="datetimeFigureOut">
               <a:rPr lang="en-US" smtClean="0"/>
-              <a:t>1/17/2020</a:t>
+              <a:t>3/17/2020</a:t>
             </a:fld>
             <a:endParaRPr lang="en-US"/>
           </a:p>
@@ -31632,7 +31640,7 @@
           <a:p>
             <a:fld id="{5958763E-B898-436D-883D-03711491D54A}" type="datetimeFigureOut">
               <a:rPr lang="en-US" smtClean="0"/>
-              <a:t>1/17/2020</a:t>
+              <a:t>3/17/2020</a:t>
             </a:fld>
             <a:endParaRPr lang="en-US"/>
           </a:p>
@@ -31840,7 +31848,7 @@
           <a:p>
             <a:fld id="{5958763E-B898-436D-883D-03711491D54A}" type="datetimeFigureOut">
               <a:rPr lang="en-US" smtClean="0"/>
-              <a:t>1/17/2020</a:t>
+              <a:t>3/17/2020</a:t>
             </a:fld>
             <a:endParaRPr lang="en-US"/>
           </a:p>
@@ -32182,7 +32190,7 @@
           <a:p>
             <a:fld id="{5958763E-B898-436D-883D-03711491D54A}" type="datetimeFigureOut">
               <a:rPr lang="en-US" smtClean="0"/>
-              <a:t>1/17/2020</a:t>
+              <a:t>3/17/2020</a:t>
             </a:fld>
             <a:endParaRPr lang="en-US"/>
           </a:p>
@@ -32419,7 +32427,7 @@
           <a:p>
             <a:fld id="{5958763E-B898-436D-883D-03711491D54A}" type="datetimeFigureOut">
               <a:rPr lang="en-US" smtClean="0"/>
-              <a:t>1/17/2020</a:t>
+              <a:t>3/17/2020</a:t>
             </a:fld>
             <a:endParaRPr lang="en-US"/>
           </a:p>
@@ -32670,7 +32678,7 @@
           <a:p>
             <a:fld id="{5958763E-B898-436D-883D-03711491D54A}" type="datetimeFigureOut">
               <a:rPr lang="en-US" smtClean="0"/>
-              <a:t>1/17/2020</a:t>
+              <a:t>3/17/2020</a:t>
             </a:fld>
             <a:endParaRPr lang="en-US"/>
           </a:p>
@@ -36318,15 +36326,7 @@
                   <a:schemeClr val="bg1"/>
                 </a:solidFill>
               </a:rPr>
-              <a:t>Static </a:t>
-            </a:r>
-            <a:r>
-              <a:rPr lang="en-US" dirty="0" smtClean="0">
-                <a:solidFill>
-                  <a:schemeClr val="bg1"/>
-                </a:solidFill>
-              </a:rPr>
-              <a:t>HTML files are too </a:t>
+              <a:t>Static HTML files are too </a:t>
             </a:r>
             <a:r>
               <a:rPr lang="en-US" i="1" dirty="0" smtClean="0">
@@ -36878,11 +36878,7 @@
           <a:p>
             <a:r>
               <a:rPr lang="en-US" dirty="0" smtClean="0"/>
-              <a:t>EJS </a:t>
-            </a:r>
-            <a:r>
-              <a:rPr lang="en-US" dirty="0" smtClean="0"/>
-              <a:t>introduction</a:t>
+              <a:t>EJS introduction</a:t>
             </a:r>
             <a:endParaRPr lang="en-US" dirty="0"/>
           </a:p>
@@ -36928,11 +36924,7 @@
             </a:r>
             <a:r>
               <a:rPr lang="en-US" dirty="0" smtClean="0"/>
-              <a:t>cript </a:t>
-            </a:r>
-            <a:r>
-              <a:rPr lang="en-US" dirty="0" smtClean="0"/>
-              <a:t>lets developers write JavaScript code directly in HTML templates</a:t>
+              <a:t>cript lets developers write JavaScript code directly in HTML templates</a:t>
             </a:r>
           </a:p>
           <a:p>
@@ -37527,14 +37519,6 @@
               </a:rPr>
               <a:t> --save</a:t>
             </a:r>
-            <a:endParaRPr lang="en-US" sz="4800" dirty="0" smtClean="0">
-              <a:solidFill>
-                <a:schemeClr val="bg2">
-                  <a:lumMod val="25000"/>
-                </a:schemeClr>
-              </a:solidFill>
-              <a:latin typeface="Consolas" panose="020B0609020204030204" pitchFamily="49" charset="0"/>
-            </a:endParaRPr>
           </a:p>
         </p:txBody>
       </p:sp>
@@ -37708,11 +37692,7 @@
           <a:p>
             <a:r>
               <a:rPr lang="en-US" dirty="0" smtClean="0"/>
-              <a:t>Server-Side </a:t>
-            </a:r>
-            <a:r>
-              <a:rPr lang="en-US" dirty="0" smtClean="0"/>
-              <a:t>Rendering – app.js</a:t>
+              <a:t>Server-Side Rendering – app.js</a:t>
             </a:r>
             <a:endParaRPr lang="en-US" dirty="0"/>
           </a:p>
@@ -37794,7 +37774,6 @@
               <a:rPr lang="en-US" sz="3200" dirty="0" smtClean="0"/>
               <a:t> template</a:t>
             </a:r>
-            <a:endParaRPr lang="en-US" sz="3200" dirty="0" smtClean="0"/>
           </a:p>
         </p:txBody>
       </p:sp>
@@ -38397,11 +38376,7 @@
           <a:p>
             <a:r>
               <a:rPr lang="en-US" dirty="0" smtClean="0"/>
-              <a:t>Client-Side – </a:t>
-            </a:r>
-            <a:r>
-              <a:rPr lang="en-US" dirty="0" smtClean="0"/>
-              <a:t>Rendered Values</a:t>
+              <a:t>Client-Side – Rendered Values</a:t>
             </a:r>
             <a:endParaRPr lang="en-US" dirty="0"/>
           </a:p>
@@ -38434,11 +38409,7 @@
             </a:r>
             <a:r>
               <a:rPr lang="en-US" dirty="0" smtClean="0"/>
-              <a:t> file, EJS segments can use the dat</a:t>
-            </a:r>
-            <a:r>
-              <a:rPr lang="en-US" dirty="0" smtClean="0"/>
-              <a:t>a passed on the server</a:t>
+              <a:t> file, EJS segments can use the data passed on the server</a:t>
             </a:r>
           </a:p>
           <a:p>

</xml_diff>